<commit_message>
new commit - Biana
</commit_message>
<xml_diff>
--- a/Proj Nguidi Biana/Monografia/Apresentação_NguiBianAnjo.pptx
+++ b/Proj Nguidi Biana/Monografia/Apresentação_NguiBianAnjo.pptx
@@ -355,7 +355,7 @@
           <a:p>
             <a:fld id="{B0600E82-8949-4FB1-8901-EB8F54AF9780}" type="datetimeFigureOut">
               <a:rPr lang="pt-AO" smtClean="0"/>
-              <a:t>19/11/2023</a:t>
+              <a:t>05/12/2023</a:t>
             </a:fld>
             <a:endParaRPr lang="pt-AO"/>
           </a:p>
@@ -563,7 +563,7 @@
           <a:p>
             <a:fld id="{B0600E82-8949-4FB1-8901-EB8F54AF9780}" type="datetimeFigureOut">
               <a:rPr lang="pt-AO" smtClean="0"/>
-              <a:t>19/11/2023</a:t>
+              <a:t>05/12/2023</a:t>
             </a:fld>
             <a:endParaRPr lang="pt-AO"/>
           </a:p>
@@ -819,7 +819,7 @@
           <a:p>
             <a:fld id="{B0600E82-8949-4FB1-8901-EB8F54AF9780}" type="datetimeFigureOut">
               <a:rPr lang="pt-AO" smtClean="0"/>
-              <a:t>19/11/2023</a:t>
+              <a:t>05/12/2023</a:t>
             </a:fld>
             <a:endParaRPr lang="pt-AO"/>
           </a:p>
@@ -993,7 +993,7 @@
           <a:p>
             <a:fld id="{B0600E82-8949-4FB1-8901-EB8F54AF9780}" type="datetimeFigureOut">
               <a:rPr lang="pt-AO" smtClean="0"/>
-              <a:t>19/11/2023</a:t>
+              <a:t>05/12/2023</a:t>
             </a:fld>
             <a:endParaRPr lang="pt-AO"/>
           </a:p>
@@ -1336,7 +1336,7 @@
           <a:p>
             <a:fld id="{B0600E82-8949-4FB1-8901-EB8F54AF9780}" type="datetimeFigureOut">
               <a:rPr lang="pt-AO" smtClean="0"/>
-              <a:t>19/11/2023</a:t>
+              <a:t>05/12/2023</a:t>
             </a:fld>
             <a:endParaRPr lang="pt-AO"/>
           </a:p>
@@ -1611,7 +1611,7 @@
           <a:p>
             <a:fld id="{B0600E82-8949-4FB1-8901-EB8F54AF9780}" type="datetimeFigureOut">
               <a:rPr lang="pt-AO" smtClean="0"/>
-              <a:t>19/11/2023</a:t>
+              <a:t>05/12/2023</a:t>
             </a:fld>
             <a:endParaRPr lang="pt-AO"/>
           </a:p>
@@ -1990,7 +1990,7 @@
           <a:p>
             <a:fld id="{B0600E82-8949-4FB1-8901-EB8F54AF9780}" type="datetimeFigureOut">
               <a:rPr lang="pt-AO" smtClean="0"/>
-              <a:t>19/11/2023</a:t>
+              <a:t>05/12/2023</a:t>
             </a:fld>
             <a:endParaRPr lang="pt-AO"/>
           </a:p>
@@ -2108,7 +2108,7 @@
           <a:p>
             <a:fld id="{B0600E82-8949-4FB1-8901-EB8F54AF9780}" type="datetimeFigureOut">
               <a:rPr lang="pt-AO" smtClean="0"/>
-              <a:t>19/11/2023</a:t>
+              <a:t>05/12/2023</a:t>
             </a:fld>
             <a:endParaRPr lang="pt-AO"/>
           </a:p>
@@ -2279,7 +2279,7 @@
           <a:p>
             <a:fld id="{B0600E82-8949-4FB1-8901-EB8F54AF9780}" type="datetimeFigureOut">
               <a:rPr lang="pt-AO" smtClean="0"/>
-              <a:t>19/11/2023</a:t>
+              <a:t>05/12/2023</a:t>
             </a:fld>
             <a:endParaRPr lang="pt-AO"/>
           </a:p>
@@ -2633,7 +2633,7 @@
           <a:p>
             <a:fld id="{B0600E82-8949-4FB1-8901-EB8F54AF9780}" type="datetimeFigureOut">
               <a:rPr lang="pt-AO" smtClean="0"/>
-              <a:t>19/11/2023</a:t>
+              <a:t>05/12/2023</a:t>
             </a:fld>
             <a:endParaRPr lang="pt-AO"/>
           </a:p>
@@ -3015,7 +3015,7 @@
           <a:p>
             <a:fld id="{B0600E82-8949-4FB1-8901-EB8F54AF9780}" type="datetimeFigureOut">
               <a:rPr lang="pt-AO" smtClean="0"/>
-              <a:t>19/11/2023</a:t>
+              <a:t>05/12/2023</a:t>
             </a:fld>
             <a:endParaRPr lang="pt-AO"/>
           </a:p>
@@ -3302,7 +3302,7 @@
           <a:p>
             <a:fld id="{B0600E82-8949-4FB1-8901-EB8F54AF9780}" type="datetimeFigureOut">
               <a:rPr lang="pt-AO" smtClean="0"/>
-              <a:t>19/11/2023</a:t>
+              <a:t>05/12/2023</a:t>
             </a:fld>
             <a:endParaRPr lang="pt-AO"/>
           </a:p>
@@ -6100,7 +6100,7 @@
         </p:nvSpPr>
         <p:spPr>
           <a:xfrm>
-            <a:off x="300504" y="1799149"/>
+            <a:off x="300504" y="2041471"/>
             <a:ext cx="4029777" cy="248851"/>
           </a:xfrm>
           <a:prstGeom prst="rect">
@@ -6176,7 +6176,7 @@
         </p:blipFill>
         <p:spPr>
           <a:xfrm>
-            <a:off x="88125" y="2096891"/>
+            <a:off x="129689" y="2380178"/>
             <a:ext cx="5765823" cy="3204969"/>
           </a:xfrm>
           <a:prstGeom prst="rect">
@@ -6334,10 +6334,48 @@
       </p:grpSpPr>
       <p:sp>
         <p:nvSpPr>
-          <p:cNvPr id="7" name="CaixaDeTexto 6">
+          <p:cNvPr id="3" name="Retângulo 2">
             <a:extLst>
               <a:ext uri="{FF2B5EF4-FFF2-40B4-BE49-F238E27FC236}">
-                <a16:creationId xmlns:a16="http://schemas.microsoft.com/office/drawing/2014/main" id="{65C8B2C8-B54A-F548-6934-7BE0B9F998B0}"/>
+                <a16:creationId xmlns:a16="http://schemas.microsoft.com/office/drawing/2014/main" id="{0BE00F46-D5E5-6BA3-5721-6A5F557F32F2}"/>
+              </a:ext>
+            </a:extLst>
+          </p:cNvPr>
+          <p:cNvSpPr/>
+          <p:nvPr/>
+        </p:nvSpPr>
+        <p:spPr>
+          <a:xfrm>
+            <a:off x="4495800" y="732239"/>
+            <a:ext cx="3162300" cy="338554"/>
+          </a:xfrm>
+          <a:prstGeom prst="rect">
+            <a:avLst/>
+          </a:prstGeom>
+        </p:spPr>
+        <p:txBody>
+          <a:bodyPr wrap="square">
+            <a:spAutoFit/>
+          </a:bodyPr>
+          <a:lstStyle/>
+          <a:p>
+            <a:r>
+              <a:rPr lang="pt-PT" sz="1600" b="1" dirty="0">
+                <a:latin typeface="Times New Roman" panose="02020603050405020304" pitchFamily="18" charset="0"/>
+                <a:ea typeface="Calibri" panose="020F0502020204030204" pitchFamily="34" charset="0"/>
+              </a:rPr>
+              <a:t>CONSIDERAÇÕES FINAIS</a:t>
+            </a:r>
+            <a:endParaRPr lang="pt-BR" sz="1600" dirty="0"/>
+          </a:p>
+        </p:txBody>
+      </p:sp>
+      <p:sp>
+        <p:nvSpPr>
+          <p:cNvPr id="2" name="CaixaDeTexto 1">
+            <a:extLst>
+              <a:ext uri="{FF2B5EF4-FFF2-40B4-BE49-F238E27FC236}">
+                <a16:creationId xmlns:a16="http://schemas.microsoft.com/office/drawing/2014/main" id="{A3A24EBF-E7F9-3DB7-F8C1-0AF8FDBBB131}"/>
               </a:ext>
             </a:extLst>
           </p:cNvPr>
@@ -6347,7 +6385,7 @@
         <p:spPr>
           <a:xfrm>
             <a:off x="368877" y="1478335"/>
-            <a:ext cx="11055927" cy="4647426"/>
+            <a:ext cx="11055927" cy="3785652"/>
           </a:xfrm>
           <a:prstGeom prst="rect">
             <a:avLst/>
@@ -6377,7 +6415,7 @@
                 <a:ea typeface="Calibri" panose="020F0502020204030204" pitchFamily="34" charset="0"/>
                 <a:cs typeface="Times New Roman" panose="02020603050405020304" pitchFamily="18" charset="0"/>
               </a:rPr>
-              <a:t>Compreendemos que os técnicos do sexo feminino (85%) tiveram maior participação; </a:t>
+              <a:t>100% dos Técnicos de Análises Clínicas do Hospital Geral de Luanda afirmam conhecer as Normas de Biossegurança, apenas 74,50% demonstraram que realmente as conhecem.</a:t>
             </a:r>
             <a:endParaRPr lang="pt-AO" sz="1600" dirty="0">
               <a:effectLst/>
@@ -6404,24 +6442,7 @@
                 <a:ea typeface="Calibri" panose="020F0502020204030204" pitchFamily="34" charset="0"/>
                 <a:cs typeface="Times New Roman" panose="02020603050405020304" pitchFamily="18" charset="0"/>
               </a:rPr>
-              <a:t>Quanto ao Nível Académico, 66,6% dos Técnicos têm o </a:t>
-            </a:r>
-            <a:r>
-              <a:rPr lang="pt-PT" sz="1600" dirty="0">
-                <a:latin typeface="Times New Roman" panose="02020603050405020304" pitchFamily="18" charset="0"/>
-                <a:ea typeface="Calibri" panose="020F0502020204030204" pitchFamily="34" charset="0"/>
-                <a:cs typeface="Times New Roman" panose="02020603050405020304" pitchFamily="18" charset="0"/>
-              </a:rPr>
-              <a:t>grau de licenciado</a:t>
-            </a:r>
-            <a:r>
-              <a:rPr lang="pt-PT" sz="1600" dirty="0">
-                <a:effectLst/>
-                <a:latin typeface="Times New Roman" panose="02020603050405020304" pitchFamily="18" charset="0"/>
-                <a:ea typeface="Calibri" panose="020F0502020204030204" pitchFamily="34" charset="0"/>
-                <a:cs typeface="Times New Roman" panose="02020603050405020304" pitchFamily="18" charset="0"/>
-              </a:rPr>
-              <a:t>;</a:t>
+              <a:t>Ficou conhecido que 84,70% dos Técnicos têm mais de 6 anos de experiência;</a:t>
             </a:r>
             <a:endParaRPr lang="pt-PT" sz="1600" dirty="0">
               <a:latin typeface="Calibri" panose="020F0502020204030204" pitchFamily="34" charset="0"/>
@@ -6447,7 +6468,7 @@
                 <a:ea typeface="Calibri" panose="020F0502020204030204" pitchFamily="34" charset="0"/>
                 <a:cs typeface="Times New Roman" panose="02020603050405020304" pitchFamily="18" charset="0"/>
               </a:rPr>
-              <a:t>Nesta pesquisa, ficou conhecido que 84,7% dos técnicos têm experiências maior que 6 anos;</a:t>
+              <a:t>Apesar de 66,60% dos Técnicos participantes da pesquisa terem o grau de licenciatura, apenas 36% dos Técnicos têm conhecimento prático sobre as normas aplicadas no laboratório clínico.</a:t>
             </a:r>
             <a:endParaRPr lang="pt-AO" sz="1600" dirty="0">
               <a:effectLst/>
@@ -6474,7 +6495,7 @@
                 <a:ea typeface="Calibri" panose="020F0502020204030204" pitchFamily="34" charset="0"/>
                 <a:cs typeface="Times New Roman" panose="02020603050405020304" pitchFamily="18" charset="0"/>
               </a:rPr>
-              <a:t>Todos os Técnicos de Análises Clínica, isto é 100%, afirmaram ter o conhecimento das Normas de Biossegurança;</a:t>
+              <a:t>Os Técnicos de Análises Clínica do Hospital Geral de Luanda apontam como principais motivos do não seguimento das Normas de Biossegurança a falta de material e a negligência;</a:t>
             </a:r>
             <a:endParaRPr lang="pt-AO" sz="1600" dirty="0">
               <a:effectLst/>
@@ -6501,88 +6522,7 @@
                 <a:ea typeface="Calibri" panose="020F0502020204030204" pitchFamily="34" charset="0"/>
                 <a:cs typeface="Times New Roman" panose="02020603050405020304" pitchFamily="18" charset="0"/>
               </a:rPr>
-              <a:t>Ao demonstrar o conhecimento sobre as NB, percebemos que 5% dos técnicos demonstraram elevado grau de debilidades;</a:t>
-            </a:r>
-          </a:p>
-          <a:p>
-            <a:pPr marL="285750" lvl="0" indent="-285750" algn="just">
-              <a:spcBef>
-                <a:spcPts val="1200"/>
-              </a:spcBef>
-              <a:spcAft>
-                <a:spcPts val="1200"/>
-              </a:spcAft>
-              <a:buFont typeface="Wingdings" panose="05000000000000000000" pitchFamily="2" charset="2"/>
-              <a:buChar char="v"/>
-            </a:pPr>
-            <a:r>
-              <a:rPr lang="pt-PT" sz="1600" dirty="0">
-                <a:effectLst/>
-                <a:latin typeface="Times New Roman" panose="02020603050405020304" pitchFamily="18" charset="0"/>
-                <a:ea typeface="Calibri" panose="020F0502020204030204" pitchFamily="34" charset="0"/>
-                <a:cs typeface="Times New Roman" panose="02020603050405020304" pitchFamily="18" charset="0"/>
-              </a:rPr>
-              <a:t> Nesta pesquisa, analisamos que 5% falaram que não seguem as NB principalmente por falta de materiais. 2,8% não seguem devido a um baixo conhecimento e 48,4% falaram que não seguem as NB por negligência. Outros 43,8% dos técnicos apoiam a ideia de que os técnicos não seguem as Normas de Biossegurança por falta de material no hospital que consequentemente gera a negligência dos técnicos;</a:t>
-            </a:r>
-            <a:endParaRPr lang="pt-PT" sz="1600" dirty="0">
-              <a:latin typeface="Calibri" panose="020F0502020204030204" pitchFamily="34" charset="0"/>
-              <a:ea typeface="Calibri" panose="020F0502020204030204" pitchFamily="34" charset="0"/>
-              <a:cs typeface="Times New Roman" panose="02020603050405020304" pitchFamily="18" charset="0"/>
-            </a:endParaRPr>
-          </a:p>
-          <a:p>
-            <a:pPr marL="285750" lvl="0" indent="-285750" algn="just">
-              <a:spcBef>
-                <a:spcPts val="1200"/>
-              </a:spcBef>
-              <a:spcAft>
-                <a:spcPts val="1200"/>
-              </a:spcAft>
-              <a:buFont typeface="Wingdings" panose="05000000000000000000" pitchFamily="2" charset="2"/>
-              <a:buChar char="v"/>
-            </a:pPr>
-            <a:r>
-              <a:rPr lang="pt-PT" sz="1600" dirty="0">
-                <a:effectLst/>
-                <a:latin typeface="Times New Roman" panose="02020603050405020304" pitchFamily="18" charset="0"/>
-                <a:ea typeface="Calibri" panose="020F0502020204030204" pitchFamily="34" charset="0"/>
-                <a:cs typeface="Times New Roman" panose="02020603050405020304" pitchFamily="18" charset="0"/>
-              </a:rPr>
-              <a:t>Apesar da maioria (92,2%) afirmar conhecer os EP, 5,6% dos técnicos não tiveram êxito em distinguir um Equipamento de Proteção </a:t>
-            </a:r>
-            <a:r>
-              <a:rPr lang="pt-PT" sz="1600" dirty="0">
-                <a:latin typeface="Times New Roman" panose="02020603050405020304" pitchFamily="18" charset="0"/>
-                <a:ea typeface="Calibri" panose="020F0502020204030204" pitchFamily="34" charset="0"/>
-                <a:cs typeface="Times New Roman" panose="02020603050405020304" pitchFamily="18" charset="0"/>
-              </a:rPr>
-              <a:t>I</a:t>
-            </a:r>
-            <a:r>
-              <a:rPr lang="pt-PT" sz="1600" dirty="0">
-                <a:effectLst/>
-                <a:latin typeface="Times New Roman" panose="02020603050405020304" pitchFamily="18" charset="0"/>
-                <a:ea typeface="Calibri" panose="020F0502020204030204" pitchFamily="34" charset="0"/>
-                <a:cs typeface="Times New Roman" panose="02020603050405020304" pitchFamily="18" charset="0"/>
-              </a:rPr>
-              <a:t>ndividual de um Equipamento de Proteção </a:t>
-            </a:r>
-            <a:r>
-              <a:rPr lang="pt-PT" sz="1600" dirty="0">
-                <a:latin typeface="Times New Roman" panose="02020603050405020304" pitchFamily="18" charset="0"/>
-                <a:ea typeface="Calibri" panose="020F0502020204030204" pitchFamily="34" charset="0"/>
-                <a:cs typeface="Times New Roman" panose="02020603050405020304" pitchFamily="18" charset="0"/>
-              </a:rPr>
-              <a:t>C</a:t>
-            </a:r>
-            <a:r>
-              <a:rPr lang="pt-PT" sz="1600" dirty="0">
-                <a:effectLst/>
-                <a:latin typeface="Times New Roman" panose="02020603050405020304" pitchFamily="18" charset="0"/>
-                <a:ea typeface="Calibri" panose="020F0502020204030204" pitchFamily="34" charset="0"/>
-                <a:cs typeface="Times New Roman" panose="02020603050405020304" pitchFamily="18" charset="0"/>
-              </a:rPr>
-              <a:t>oletiva;</a:t>
+              <a:t>Pelo questionário aplicado e pela observação feita, concluímos que as Normas de Biossegurança mais conhecidas e aplicadas no Laboratório do Hospital Geral de Luanda são o uso correto do jaleco, o uso de calçados fechados, a higienização das mãos e o uso de gorros (toucas);</a:t>
             </a:r>
             <a:endParaRPr lang="pt-AO" sz="1600" dirty="0">
               <a:effectLst/>
@@ -6590,44 +6530,6 @@
               <a:ea typeface="Calibri" panose="020F0502020204030204" pitchFamily="34" charset="0"/>
               <a:cs typeface="Times New Roman" panose="02020603050405020304" pitchFamily="18" charset="0"/>
             </a:endParaRPr>
-          </a:p>
-        </p:txBody>
-      </p:sp>
-      <p:sp>
-        <p:nvSpPr>
-          <p:cNvPr id="3" name="Retângulo 2">
-            <a:extLst>
-              <a:ext uri="{FF2B5EF4-FFF2-40B4-BE49-F238E27FC236}">
-                <a16:creationId xmlns:a16="http://schemas.microsoft.com/office/drawing/2014/main" id="{0BE00F46-D5E5-6BA3-5721-6A5F557F32F2}"/>
-              </a:ext>
-            </a:extLst>
-          </p:cNvPr>
-          <p:cNvSpPr/>
-          <p:nvPr/>
-        </p:nvSpPr>
-        <p:spPr>
-          <a:xfrm>
-            <a:off x="4495800" y="732239"/>
-            <a:ext cx="3162300" cy="338554"/>
-          </a:xfrm>
-          <a:prstGeom prst="rect">
-            <a:avLst/>
-          </a:prstGeom>
-        </p:spPr>
-        <p:txBody>
-          <a:bodyPr wrap="square">
-            <a:spAutoFit/>
-          </a:bodyPr>
-          <a:lstStyle/>
-          <a:p>
-            <a:r>
-              <a:rPr lang="pt-PT" sz="1600" b="1" dirty="0">
-                <a:latin typeface="Times New Roman" panose="02020603050405020304" pitchFamily="18" charset="0"/>
-                <a:ea typeface="Calibri" panose="020F0502020204030204" pitchFamily="34" charset="0"/>
-              </a:rPr>
-              <a:t>CONSIDERAÇÕES FINAIS</a:t>
-            </a:r>
-            <a:endParaRPr lang="pt-BR" sz="1600" dirty="0"/>
           </a:p>
         </p:txBody>
       </p:sp>
@@ -6678,8 +6580,8 @@
         </p:nvSpPr>
         <p:spPr>
           <a:xfrm>
-            <a:off x="4791440" y="719539"/>
-            <a:ext cx="2609119" cy="338554"/>
+            <a:off x="5222047" y="691829"/>
+            <a:ext cx="1441989" cy="338554"/>
           </a:xfrm>
           <a:prstGeom prst="rect">
             <a:avLst/>
@@ -6696,7 +6598,7 @@
                 <a:latin typeface="Times New Roman" panose="02020603050405020304" pitchFamily="18" charset="0"/>
                 <a:ea typeface="Calibri" panose="020F0502020204030204" pitchFamily="34" charset="0"/>
               </a:rPr>
-              <a:t>RECOMENDAÇÕES</a:t>
+              <a:t>SUGESTÕES</a:t>
             </a:r>
             <a:endParaRPr lang="pt-BR" sz="1600" dirty="0"/>
           </a:p>
@@ -6912,23 +6814,39 @@
         </p:nvSpPr>
         <p:spPr>
           <a:xfrm>
-            <a:off x="1961809" y="2639659"/>
-            <a:ext cx="8573181" cy="2215991"/>
+            <a:off x="87088" y="2639659"/>
+            <a:ext cx="11988800" cy="2646878"/>
           </a:xfrm>
           <a:prstGeom prst="rect">
             <a:avLst/>
           </a:prstGeom>
-          <a:noFill/>
-        </p:spPr>
-        <p:txBody>
-          <a:bodyPr wrap="none" lIns="91440" tIns="45720" rIns="91440" bIns="45720">
+          <a:ln>
+            <a:noFill/>
+          </a:ln>
+        </p:spPr>
+        <p:style>
+          <a:lnRef idx="2">
+            <a:schemeClr val="accent2"/>
+          </a:lnRef>
+          <a:fillRef idx="1">
+            <a:schemeClr val="lt1"/>
+          </a:fillRef>
+          <a:effectRef idx="0">
+            <a:schemeClr val="accent2"/>
+          </a:effectRef>
+          <a:fontRef idx="minor">
+            <a:schemeClr val="dk1"/>
+          </a:fontRef>
+        </p:style>
+        <p:txBody>
+          <a:bodyPr wrap="square" lIns="91440" tIns="45720" rIns="91440" bIns="45720">
             <a:spAutoFit/>
           </a:bodyPr>
           <a:lstStyle/>
           <a:p>
             <a:pPr algn="ctr"/>
             <a:r>
-              <a:rPr lang="pt-BR" sz="13800" b="0" cap="none" spc="0" dirty="0">
+              <a:rPr lang="pt-BR" sz="16600" b="0" cap="none" spc="0" dirty="0">
                 <a:ln w="0"/>
                 <a:solidFill>
                   <a:schemeClr val="accent1"/>
@@ -6940,6 +6858,8 @@
                     </a:srgbClr>
                   </a:outerShdw>
                 </a:effectLst>
+                <a:latin typeface="Times New Roman" panose="02020603050405020304" pitchFamily="18" charset="0"/>
+                <a:cs typeface="Times New Roman" panose="02020603050405020304" pitchFamily="18" charset="0"/>
               </a:rPr>
               <a:t>OBRIGADO</a:t>
             </a:r>
@@ -6982,8 +6902,8 @@
         </p:blipFill>
         <p:spPr bwMode="auto">
           <a:xfrm>
-            <a:off x="5394463" y="268870"/>
-            <a:ext cx="1403074" cy="1156085"/>
+            <a:off x="5477589" y="255016"/>
+            <a:ext cx="1574373" cy="1324403"/>
           </a:xfrm>
           <a:prstGeom prst="rect">
             <a:avLst/>
@@ -7010,6 +6930,141 @@
   <p:transition spd="slow">
     <p:cover/>
   </p:transition>
+  <p:timing>
+    <p:tnLst>
+      <p:par>
+        <p:cTn id="1" dur="indefinite" restart="never" nodeType="tmRoot">
+          <p:childTnLst>
+            <p:seq concurrent="1" nextAc="seek">
+              <p:cTn id="2" dur="indefinite" nodeType="mainSeq">
+                <p:childTnLst>
+                  <p:par>
+                    <p:cTn id="3" fill="hold">
+                      <p:stCondLst>
+                        <p:cond delay="indefinite"/>
+                        <p:cond evt="onBegin" delay="0">
+                          <p:tn val="2"/>
+                        </p:cond>
+                      </p:stCondLst>
+                      <p:childTnLst>
+                        <p:par>
+                          <p:cTn id="4" fill="hold">
+                            <p:stCondLst>
+                              <p:cond delay="0"/>
+                            </p:stCondLst>
+                            <p:childTnLst>
+                              <p:par>
+                                <p:cTn id="5" presetID="53" presetClass="entr" presetSubtype="16" fill="hold" grpId="0" nodeType="afterEffect">
+                                  <p:stCondLst>
+                                    <p:cond delay="0"/>
+                                  </p:stCondLst>
+                                  <p:childTnLst>
+                                    <p:set>
+                                      <p:cBhvr>
+                                        <p:cTn id="6" dur="1" fill="hold">
+                                          <p:stCondLst>
+                                            <p:cond delay="0"/>
+                                          </p:stCondLst>
+                                        </p:cTn>
+                                        <p:tgtEl>
+                                          <p:spTgt spid="2"/>
+                                        </p:tgtEl>
+                                        <p:attrNameLst>
+                                          <p:attrName>style.visibility</p:attrName>
+                                        </p:attrNameLst>
+                                      </p:cBhvr>
+                                      <p:to>
+                                        <p:strVal val="visible"/>
+                                      </p:to>
+                                    </p:set>
+                                    <p:anim calcmode="lin" valueType="num">
+                                      <p:cBhvr>
+                                        <p:cTn id="7" dur="750" fill="hold"/>
+                                        <p:tgtEl>
+                                          <p:spTgt spid="2"/>
+                                        </p:tgtEl>
+                                        <p:attrNameLst>
+                                          <p:attrName>ppt_w</p:attrName>
+                                        </p:attrNameLst>
+                                      </p:cBhvr>
+                                      <p:tavLst>
+                                        <p:tav tm="0">
+                                          <p:val>
+                                            <p:fltVal val="0"/>
+                                          </p:val>
+                                        </p:tav>
+                                        <p:tav tm="100000">
+                                          <p:val>
+                                            <p:strVal val="#ppt_w"/>
+                                          </p:val>
+                                        </p:tav>
+                                      </p:tavLst>
+                                    </p:anim>
+                                    <p:anim calcmode="lin" valueType="num">
+                                      <p:cBhvr>
+                                        <p:cTn id="8" dur="750" fill="hold"/>
+                                        <p:tgtEl>
+                                          <p:spTgt spid="2"/>
+                                        </p:tgtEl>
+                                        <p:attrNameLst>
+                                          <p:attrName>ppt_h</p:attrName>
+                                        </p:attrNameLst>
+                                      </p:cBhvr>
+                                      <p:tavLst>
+                                        <p:tav tm="0">
+                                          <p:val>
+                                            <p:fltVal val="0"/>
+                                          </p:val>
+                                        </p:tav>
+                                        <p:tav tm="100000">
+                                          <p:val>
+                                            <p:strVal val="#ppt_h"/>
+                                          </p:val>
+                                        </p:tav>
+                                      </p:tavLst>
+                                    </p:anim>
+                                    <p:animEffect transition="in" filter="fade">
+                                      <p:cBhvr>
+                                        <p:cTn id="9" dur="750"/>
+                                        <p:tgtEl>
+                                          <p:spTgt spid="2"/>
+                                        </p:tgtEl>
+                                      </p:cBhvr>
+                                    </p:animEffect>
+                                  </p:childTnLst>
+                                </p:cTn>
+                              </p:par>
+                            </p:childTnLst>
+                          </p:cTn>
+                        </p:par>
+                      </p:childTnLst>
+                    </p:cTn>
+                  </p:par>
+                </p:childTnLst>
+              </p:cTn>
+              <p:prevCondLst>
+                <p:cond evt="onPrev" delay="0">
+                  <p:tgtEl>
+                    <p:sldTgt/>
+                  </p:tgtEl>
+                </p:cond>
+              </p:prevCondLst>
+              <p:nextCondLst>
+                <p:cond evt="onNext" delay="0">
+                  <p:tgtEl>
+                    <p:sldTgt/>
+                  </p:tgtEl>
+                </p:cond>
+              </p:nextCondLst>
+            </p:seq>
+          </p:childTnLst>
+        </p:cTn>
+      </p:par>
+    </p:tnLst>
+    <p:bldLst>
+      <p:bldP spid="2" grpId="0" animBg="1"/>
+    </p:bldLst>
+  </p:timing>
 </p:sld>
 </file>
 
@@ -7084,7 +7139,7 @@
               <a:rPr lang="pt-PT" sz="1600" dirty="0">
                 <a:latin typeface="Times New Roman" panose="02020603050405020304" pitchFamily="18" charset="0"/>
               </a:rPr>
-              <a:t>PROBLEMATIZAÇÃO</a:t>
+              <a:t>PROBLEMA</a:t>
             </a:r>
           </a:p>
           <a:p>
@@ -7210,7 +7265,7 @@
               <a:rPr lang="pt-PT" sz="1600" dirty="0">
                 <a:latin typeface="Times New Roman" panose="02020603050405020304" pitchFamily="18" charset="0"/>
               </a:rPr>
-              <a:t>RECOMENDAÇÕES</a:t>
+              <a:t>SUGESTÕES</a:t>
             </a:r>
             <a:endParaRPr lang="pt-BR" sz="1600" dirty="0"/>
           </a:p>
@@ -7230,8 +7285,8 @@
         </p:nvSpPr>
         <p:spPr>
           <a:xfrm>
-            <a:off x="5565563" y="495921"/>
-            <a:ext cx="1060873" cy="369332"/>
+            <a:off x="5181601" y="495921"/>
+            <a:ext cx="1444836" cy="369332"/>
           </a:xfrm>
           <a:prstGeom prst="rect">
             <a:avLst/>
@@ -7246,9 +7301,8 @@
             <a:r>
               <a:rPr lang="pt-PT" b="1" dirty="0">
                 <a:latin typeface="Times New Roman" panose="02020603050405020304" pitchFamily="18" charset="0"/>
-                <a:ea typeface="Calibri" panose="020F0502020204030204" pitchFamily="34" charset="0"/>
-              </a:rPr>
-              <a:t>ÍNDICE</a:t>
+              </a:rPr>
+              <a:t>SUMÁRIO</a:t>
             </a:r>
             <a:endParaRPr lang="pt-BR" dirty="0"/>
           </a:p>
@@ -7454,7 +7508,7 @@
                 <a:ea typeface="Calibri" panose="020F0502020204030204" pitchFamily="34" charset="0"/>
                 <a:cs typeface="Times New Roman" panose="02020603050405020304" pitchFamily="18" charset="0"/>
               </a:rPr>
-              <a:t>PROBLEMATIZAÇÃO</a:t>
+              <a:t>PROBLEMA</a:t>
             </a:r>
           </a:p>
           <a:p>
@@ -9120,7 +9174,7 @@
         </p:nvSpPr>
         <p:spPr>
           <a:xfrm>
-            <a:off x="637308" y="1841116"/>
+            <a:off x="637308" y="2041840"/>
             <a:ext cx="4613564" cy="248851"/>
           </a:xfrm>
           <a:prstGeom prst="rect">
@@ -9196,7 +9250,7 @@
         </p:blipFill>
         <p:spPr>
           <a:xfrm>
-            <a:off x="426223" y="2218444"/>
+            <a:off x="431619" y="2410742"/>
             <a:ext cx="4819253" cy="3115556"/>
           </a:xfrm>
           <a:prstGeom prst="rect">

</xml_diff>